<commit_message>
add imagem estrutura flutter
</commit_message>
<xml_diff>
--- a/unidade_3/3A - Marcelo Luiz Jung/Introdução ao Flutter.pptx
+++ b/unidade_3/3A - Marcelo Luiz Jung/Introdução ao Flutter.pptx
@@ -7,11 +7,12 @@
   <p:sldIdLst>
     <p:sldId id="256" r:id="rId2"/>
     <p:sldId id="257" r:id="rId3"/>
-    <p:sldId id="259" r:id="rId4"/>
-    <p:sldId id="260" r:id="rId5"/>
-    <p:sldId id="261" r:id="rId6"/>
-    <p:sldId id="262" r:id="rId7"/>
-    <p:sldId id="258" r:id="rId8"/>
+    <p:sldId id="263" r:id="rId4"/>
+    <p:sldId id="259" r:id="rId5"/>
+    <p:sldId id="260" r:id="rId6"/>
+    <p:sldId id="261" r:id="rId7"/>
+    <p:sldId id="262" r:id="rId8"/>
+    <p:sldId id="258" r:id="rId9"/>
   </p:sldIdLst>
   <p:sldSz cx="12192000" cy="6858000"/>
   <p:notesSz cx="6858000" cy="9144000"/>
@@ -110,6 +111,11 @@
       </a:defRPr>
     </a:lvl9pPr>
   </p:defaultTextStyle>
+  <p:extLst>
+    <p:ext uri="{EFAFB233-063F-42B5-8137-9DF3F51BA10A}">
+      <p15:sldGuideLst xmlns:p15="http://schemas.microsoft.com/office/powerpoint/2012/main"/>
+    </p:ext>
+  </p:extLst>
 </p:presentation>
 </file>
 
@@ -283,7 +289,7 @@
             <a:fld id="{87DE6118-2437-4B30-8E3C-4D2BE6020583}" type="datetimeFigureOut">
               <a:rPr lang="en-US" dirty="0"/>
               <a:pPr/>
-              <a:t>5/8/2021</a:t>
+              <a:t>5/10/2021</a:t>
             </a:fld>
             <a:endParaRPr lang="en-US" dirty="0"/>
           </a:p>
@@ -609,7 +615,7 @@
           <a:p>
             <a:fld id="{87DE6118-2437-4B30-8E3C-4D2BE6020583}" type="datetimeFigureOut">
               <a:rPr lang="en-US" dirty="0"/>
-              <a:t>5/8/2021</a:t>
+              <a:t>5/10/2021</a:t>
             </a:fld>
             <a:endParaRPr lang="en-US" dirty="0"/>
           </a:p>
@@ -784,7 +790,7 @@
           <a:p>
             <a:fld id="{87DE6118-2437-4B30-8E3C-4D2BE6020583}" type="datetimeFigureOut">
               <a:rPr lang="en-US" dirty="0"/>
-              <a:t>5/8/2021</a:t>
+              <a:t>5/10/2021</a:t>
             </a:fld>
             <a:endParaRPr lang="en-US" dirty="0"/>
           </a:p>
@@ -949,7 +955,7 @@
           <a:p>
             <a:fld id="{87DE6118-2437-4B30-8E3C-4D2BE6020583}" type="datetimeFigureOut">
               <a:rPr lang="en-US" dirty="0"/>
-              <a:t>5/8/2021</a:t>
+              <a:t>5/10/2021</a:t>
             </a:fld>
             <a:endParaRPr lang="en-US" dirty="0"/>
           </a:p>
@@ -1222,7 +1228,7 @@
             <a:fld id="{87DE6118-2437-4B30-8E3C-4D2BE6020583}" type="datetimeFigureOut">
               <a:rPr lang="en-US" dirty="0"/>
               <a:pPr/>
-              <a:t>5/8/2021</a:t>
+              <a:t>5/10/2021</a:t>
             </a:fld>
             <a:endParaRPr lang="en-US" dirty="0"/>
           </a:p>
@@ -1612,7 +1618,7 @@
           <a:p>
             <a:fld id="{87DE6118-2437-4B30-8E3C-4D2BE6020583}" type="datetimeFigureOut">
               <a:rPr lang="en-US" dirty="0"/>
-              <a:t>5/8/2021</a:t>
+              <a:t>5/10/2021</a:t>
             </a:fld>
             <a:endParaRPr lang="en-US" dirty="0"/>
           </a:p>
@@ -2084,7 +2090,7 @@
           <a:p>
             <a:fld id="{87DE6118-2437-4B30-8E3C-4D2BE6020583}" type="datetimeFigureOut">
               <a:rPr lang="en-US" dirty="0"/>
-              <a:t>5/8/2021</a:t>
+              <a:t>5/10/2021</a:t>
             </a:fld>
             <a:endParaRPr lang="en-US" dirty="0"/>
           </a:p>
@@ -2197,7 +2203,7 @@
           <a:p>
             <a:fld id="{87DE6118-2437-4B30-8E3C-4D2BE6020583}" type="datetimeFigureOut">
               <a:rPr lang="en-US" dirty="0"/>
-              <a:t>5/8/2021</a:t>
+              <a:t>5/10/2021</a:t>
             </a:fld>
             <a:endParaRPr lang="en-US" dirty="0"/>
           </a:p>
@@ -2287,7 +2293,7 @@
           <a:p>
             <a:fld id="{87DE6118-2437-4B30-8E3C-4D2BE6020583}" type="datetimeFigureOut">
               <a:rPr lang="en-US" dirty="0"/>
-              <a:t>5/8/2021</a:t>
+              <a:t>5/10/2021</a:t>
             </a:fld>
             <a:endParaRPr lang="en-US" dirty="0"/>
           </a:p>
@@ -2629,7 +2635,7 @@
             <a:fld id="{87DE6118-2437-4B30-8E3C-4D2BE6020583}" type="datetimeFigureOut">
               <a:rPr lang="en-US" dirty="0"/>
               <a:pPr/>
-              <a:t>5/8/2021</a:t>
+              <a:t>5/10/2021</a:t>
             </a:fld>
             <a:endParaRPr lang="en-US" dirty="0"/>
           </a:p>
@@ -3014,7 +3020,7 @@
             <a:fld id="{87DE6118-2437-4B30-8E3C-4D2BE6020583}" type="datetimeFigureOut">
               <a:rPr lang="en-US" dirty="0"/>
               <a:pPr/>
-              <a:t>5/8/2021</a:t>
+              <a:t>5/10/2021</a:t>
             </a:fld>
             <a:endParaRPr lang="en-US" dirty="0"/>
           </a:p>
@@ -3289,7 +3295,7 @@
             <a:fld id="{87DE6118-2437-4B30-8E3C-4D2BE6020583}" type="datetimeFigureOut">
               <a:rPr lang="en-US" dirty="0"/>
               <a:pPr/>
-              <a:t>5/8/2021</a:t>
+              <a:t>5/10/2021</a:t>
             </a:fld>
             <a:endParaRPr lang="en-US" dirty="0"/>
           </a:p>
@@ -4252,7 +4258,7 @@
           <p:cNvPr id="2" name="Título 1">
             <a:extLst>
               <a:ext uri="{FF2B5EF4-FFF2-40B4-BE49-F238E27FC236}">
-                <a16:creationId xmlns:a16="http://schemas.microsoft.com/office/drawing/2014/main" id="{48310C45-E9E7-4E99-8F94-FA4B93A2EE88}"/>
+                <a16:creationId xmlns:a16="http://schemas.microsoft.com/office/drawing/2014/main" id="{E870F39C-9205-4F2A-AB27-6BBFE2385C72}"/>
               </a:ext>
             </a:extLst>
           </p:cNvPr>
@@ -4265,186 +4271,69 @@
         </p:nvSpPr>
         <p:spPr/>
         <p:txBody>
-          <a:bodyPr>
-            <a:normAutofit fontScale="90000"/>
-          </a:bodyPr>
+          <a:bodyPr/>
           <a:lstStyle/>
           <a:p>
             <a:r>
-              <a:rPr lang="en-US" dirty="0" err="1"/>
-              <a:t>Curiosidades</a:t>
-            </a:r>
-            <a:r>
-              <a:rPr lang="en-US" dirty="0"/>
-              <a:t>:</a:t>
-            </a:r>
-            <a:br>
-              <a:rPr lang="en-US" dirty="0"/>
-            </a:br>
-            <a:r>
-              <a:rPr lang="en-US" dirty="0"/>
-              <a:t> </a:t>
-            </a:r>
-            <a:br>
-              <a:rPr lang="en-US" dirty="0"/>
-            </a:br>
-            <a:r>
-              <a:rPr lang="en-US" dirty="0" err="1"/>
-              <a:t>Linguagem</a:t>
-            </a:r>
-            <a:r>
-              <a:rPr lang="en-US" dirty="0"/>
-              <a:t> de </a:t>
-            </a:r>
-            <a:r>
-              <a:rPr lang="en-US" dirty="0" err="1"/>
-              <a:t>programação</a:t>
-            </a:r>
-            <a:r>
-              <a:rPr lang="en-US" dirty="0"/>
-              <a:t> Dart</a:t>
-            </a:r>
-          </a:p>
-        </p:txBody>
-      </p:sp>
-      <p:sp>
-        <p:nvSpPr>
-          <p:cNvPr id="3" name="Espaço Reservado para Conteúdo 2">
+              <a:rPr lang="pt-BR" dirty="0"/>
+              <a:t>Estrutura base:</a:t>
+            </a:r>
+          </a:p>
+        </p:txBody>
+      </p:sp>
+      <p:pic>
+        <p:nvPicPr>
+          <p:cNvPr id="1026" name="Picture 2">
             <a:extLst>
               <a:ext uri="{FF2B5EF4-FFF2-40B4-BE49-F238E27FC236}">
-                <a16:creationId xmlns:a16="http://schemas.microsoft.com/office/drawing/2014/main" id="{5A41297C-DF4E-4003-82EC-762AA8129D91}"/>
+                <a16:creationId xmlns:a16="http://schemas.microsoft.com/office/drawing/2014/main" id="{4B49579A-F8AA-41CF-B9E9-E0974C4480EE}"/>
               </a:ext>
             </a:extLst>
           </p:cNvPr>
-          <p:cNvSpPr>
-            <a:spLocks noGrp="1"/>
-          </p:cNvSpPr>
+          <p:cNvPicPr>
+            <a:picLocks noGrp="1" noChangeAspect="1" noChangeArrowheads="1"/>
+          </p:cNvPicPr>
           <p:nvPr>
             <p:ph idx="1"/>
           </p:nvPr>
-        </p:nvSpPr>
-        <p:spPr>
+        </p:nvPicPr>
+        <p:blipFill>
+          <a:blip r:embed="rId2">
+            <a:extLst>
+              <a:ext uri="{28A0092B-C50C-407E-A947-70E740481C1C}">
+                <a14:useLocalDpi xmlns:a14="http://schemas.microsoft.com/office/drawing/2010/main" val="0"/>
+              </a:ext>
+            </a:extLst>
+          </a:blip>
+          <a:srcRect/>
+          <a:stretch>
+            <a:fillRect/>
+          </a:stretch>
+        </p:blipFill>
+        <p:spPr bwMode="auto">
           <a:xfrm>
-            <a:off x="1371600" y="3186363"/>
-            <a:ext cx="9601200" cy="3581400"/>
+            <a:off x="3169368" y="1428750"/>
+            <a:ext cx="6005664" cy="5164700"/>
           </a:xfrm>
+          <a:prstGeom prst="rect">
+            <a:avLst/>
+          </a:prstGeom>
+          <a:noFill/>
+          <a:extLst>
+            <a:ext uri="{909E8E84-426E-40DD-AFC4-6F175D3DCCD1}">
+              <a14:hiddenFill xmlns:a14="http://schemas.microsoft.com/office/drawing/2010/main">
+                <a:solidFill>
+                  <a:srgbClr val="FFFFFF"/>
+                </a:solidFill>
+              </a14:hiddenFill>
+            </a:ext>
+          </a:extLst>
         </p:spPr>
-        <p:txBody>
-          <a:bodyPr/>
-          <a:lstStyle/>
-          <a:p>
-            <a:pPr algn="just"/>
-            <a:r>
-              <a:rPr lang="en-US" dirty="0" err="1"/>
-              <a:t>Os</a:t>
-            </a:r>
-            <a:r>
-              <a:rPr lang="en-US" dirty="0"/>
-              <a:t> </a:t>
-            </a:r>
-            <a:r>
-              <a:rPr lang="en-US" dirty="0" err="1"/>
-              <a:t>aplicativos</a:t>
-            </a:r>
-            <a:r>
-              <a:rPr lang="en-US" dirty="0"/>
-              <a:t> Flutter </a:t>
-            </a:r>
-            <a:r>
-              <a:rPr lang="en-US" dirty="0" err="1"/>
-              <a:t>são</a:t>
-            </a:r>
-            <a:r>
-              <a:rPr lang="en-US" dirty="0"/>
-              <a:t> </a:t>
-            </a:r>
-            <a:r>
-              <a:rPr lang="en-US" dirty="0" err="1"/>
-              <a:t>escritos</a:t>
-            </a:r>
-            <a:r>
-              <a:rPr lang="en-US" dirty="0"/>
-              <a:t> </a:t>
-            </a:r>
-            <a:r>
-              <a:rPr lang="en-US" dirty="0" err="1"/>
-              <a:t>na</a:t>
-            </a:r>
-            <a:r>
-              <a:rPr lang="en-US" dirty="0"/>
-              <a:t> </a:t>
-            </a:r>
-            <a:r>
-              <a:rPr lang="en-US" dirty="0" err="1"/>
-              <a:t>linguagem</a:t>
-            </a:r>
-            <a:r>
-              <a:rPr lang="en-US" dirty="0"/>
-              <a:t> de </a:t>
-            </a:r>
-            <a:r>
-              <a:rPr lang="en-US" dirty="0" err="1"/>
-              <a:t>programação</a:t>
-            </a:r>
-            <a:r>
-              <a:rPr lang="en-US" dirty="0"/>
-              <a:t> Dart e dessa forma </a:t>
-            </a:r>
-            <a:r>
-              <a:rPr lang="en-US" dirty="0" err="1"/>
-              <a:t>podem</a:t>
-            </a:r>
-            <a:r>
-              <a:rPr lang="en-US" dirty="0"/>
-              <a:t> </a:t>
-            </a:r>
-            <a:r>
-              <a:rPr lang="en-US" dirty="0" err="1"/>
-              <a:t>utilizar</a:t>
-            </a:r>
-            <a:r>
-              <a:rPr lang="en-US" dirty="0"/>
-              <a:t> </a:t>
-            </a:r>
-            <a:r>
-              <a:rPr lang="en-US" dirty="0" err="1"/>
-              <a:t>os</a:t>
-            </a:r>
-            <a:r>
-              <a:rPr lang="en-US" dirty="0"/>
-              <a:t> </a:t>
-            </a:r>
-            <a:r>
-              <a:rPr lang="en-US" dirty="0" err="1"/>
-              <a:t>recursos</a:t>
-            </a:r>
-            <a:r>
-              <a:rPr lang="en-US" dirty="0"/>
-              <a:t> mais </a:t>
-            </a:r>
-            <a:r>
-              <a:rPr lang="en-US" dirty="0" err="1"/>
-              <a:t>avançados</a:t>
-            </a:r>
-            <a:r>
-              <a:rPr lang="en-US" dirty="0"/>
-              <a:t> da </a:t>
-            </a:r>
-            <a:r>
-              <a:rPr lang="en-US" dirty="0" err="1"/>
-              <a:t>linguagem</a:t>
-            </a:r>
-            <a:r>
-              <a:rPr lang="en-US" dirty="0"/>
-              <a:t>.</a:t>
-            </a:r>
-          </a:p>
-        </p:txBody>
-      </p:sp>
+      </p:pic>
     </p:spTree>
     <p:extLst>
       <p:ext uri="{BB962C8B-B14F-4D97-AF65-F5344CB8AC3E}">
-        <p14:creationId xmlns:p14="http://schemas.microsoft.com/office/powerpoint/2010/main" val="2170704509"/>
+        <p14:creationId xmlns:p14="http://schemas.microsoft.com/office/powerpoint/2010/main" val="2447997112"/>
       </p:ext>
     </p:extLst>
   </p:cSld>
@@ -4476,7 +4365,7 @@
           <p:cNvPr id="2" name="Título 1">
             <a:extLst>
               <a:ext uri="{FF2B5EF4-FFF2-40B4-BE49-F238E27FC236}">
-                <a16:creationId xmlns:a16="http://schemas.microsoft.com/office/drawing/2014/main" id="{C7649A9F-4BF0-44EB-AAC4-EE9537A036D1}"/>
+                <a16:creationId xmlns:a16="http://schemas.microsoft.com/office/drawing/2014/main" id="{48310C45-E9E7-4E99-8F94-FA4B93A2EE88}"/>
               </a:ext>
             </a:extLst>
           </p:cNvPr>
@@ -4489,12 +4378,44 @@
         </p:nvSpPr>
         <p:spPr/>
         <p:txBody>
-          <a:bodyPr/>
+          <a:bodyPr>
+            <a:normAutofit fontScale="90000"/>
+          </a:bodyPr>
           <a:lstStyle/>
           <a:p>
             <a:r>
-              <a:rPr lang="en-US" dirty="0"/>
-              <a:t>Flutter Engine</a:t>
+              <a:rPr lang="en-US" dirty="0" err="1"/>
+              <a:t>Curiosidades</a:t>
+            </a:r>
+            <a:r>
+              <a:rPr lang="en-US" dirty="0"/>
+              <a:t>:</a:t>
+            </a:r>
+            <a:br>
+              <a:rPr lang="en-US" dirty="0"/>
+            </a:br>
+            <a:r>
+              <a:rPr lang="en-US" dirty="0"/>
+              <a:t> </a:t>
+            </a:r>
+            <a:br>
+              <a:rPr lang="en-US" dirty="0"/>
+            </a:br>
+            <a:r>
+              <a:rPr lang="en-US" dirty="0" err="1"/>
+              <a:t>Linguagem</a:t>
+            </a:r>
+            <a:r>
+              <a:rPr lang="en-US" dirty="0"/>
+              <a:t> de </a:t>
+            </a:r>
+            <a:r>
+              <a:rPr lang="en-US" dirty="0" err="1"/>
+              <a:t>programação</a:t>
+            </a:r>
+            <a:r>
+              <a:rPr lang="en-US" dirty="0"/>
+              <a:t> Dart</a:t>
             </a:r>
           </a:p>
         </p:txBody>
@@ -4504,7 +4425,7 @@
           <p:cNvPr id="3" name="Espaço Reservado para Conteúdo 2">
             <a:extLst>
               <a:ext uri="{FF2B5EF4-FFF2-40B4-BE49-F238E27FC236}">
-                <a16:creationId xmlns:a16="http://schemas.microsoft.com/office/drawing/2014/main" id="{EE2C7860-58D5-4C7E-855A-562C2E4D797C}"/>
+                <a16:creationId xmlns:a16="http://schemas.microsoft.com/office/drawing/2014/main" id="{5A41297C-DF4E-4003-82EC-762AA8129D91}"/>
               </a:ext>
             </a:extLst>
           </p:cNvPr>
@@ -4517,7 +4438,7 @@
         </p:nvSpPr>
         <p:spPr>
           <a:xfrm>
-            <a:off x="1371600" y="1852104"/>
+            <a:off x="1371600" y="3186363"/>
             <a:ext cx="9601200" cy="3581400"/>
           </a:xfrm>
         </p:spPr>
@@ -4525,26 +4446,10 @@
           <a:bodyPr/>
           <a:lstStyle/>
           <a:p>
-            <a:pPr>
-              <a:lnSpc>
-                <a:spcPct val="150000"/>
-              </a:lnSpc>
-            </a:pPr>
-            <a:r>
-              <a:rPr lang="en-US" dirty="0"/>
-              <a:t>É o “</a:t>
-            </a:r>
-            <a:r>
-              <a:rPr lang="en-US" dirty="0" err="1"/>
-              <a:t>coração</a:t>
-            </a:r>
-            <a:r>
-              <a:rPr lang="en-US" dirty="0"/>
-              <a:t>” do Flutter, </a:t>
-            </a:r>
-            <a:r>
-              <a:rPr lang="en-US" dirty="0" err="1"/>
-              <a:t>escrito</a:t>
+            <a:pPr algn="just"/>
+            <a:r>
+              <a:rPr lang="en-US" dirty="0" err="1"/>
+              <a:t>Os</a:t>
             </a:r>
             <a:r>
               <a:rPr lang="en-US" dirty="0"/>
@@ -4552,34 +4457,15 @@
             </a:r>
             <a:r>
               <a:rPr lang="en-US" dirty="0" err="1"/>
-              <a:t>em</a:t>
-            </a:r>
-            <a:r>
-              <a:rPr lang="en-US" dirty="0"/>
-              <a:t> C++;</a:t>
-            </a:r>
-          </a:p>
-          <a:p>
-            <a:pPr>
-              <a:lnSpc>
-                <a:spcPct val="150000"/>
-              </a:lnSpc>
-            </a:pPr>
-            <a:r>
-              <a:rPr lang="en-US" dirty="0"/>
-              <a:t>É um runtime </a:t>
-            </a:r>
-            <a:r>
-              <a:rPr lang="en-US" dirty="0" err="1"/>
-              <a:t>portátil</a:t>
-            </a:r>
-            <a:r>
-              <a:rPr lang="en-US" dirty="0"/>
-              <a:t> para </a:t>
-            </a:r>
-            <a:r>
-              <a:rPr lang="en-US" dirty="0" err="1"/>
-              <a:t>hospedar</a:t>
+              <a:t>aplicativos</a:t>
+            </a:r>
+            <a:r>
+              <a:rPr lang="en-US" dirty="0"/>
+              <a:t> Flutter </a:t>
+            </a:r>
+            <a:r>
+              <a:rPr lang="en-US" dirty="0" err="1"/>
+              <a:t>são</a:t>
             </a:r>
             <a:r>
               <a:rPr lang="en-US" dirty="0"/>
@@ -4587,7 +4473,7 @@
             </a:r>
             <a:r>
               <a:rPr lang="en-US" dirty="0" err="1"/>
-              <a:t>aplicativos</a:t>
+              <a:t>escritos</a:t>
             </a:r>
             <a:r>
               <a:rPr lang="en-US" dirty="0"/>
@@ -4595,58 +4481,7 @@
             </a:r>
             <a:r>
               <a:rPr lang="en-US" dirty="0" err="1"/>
-              <a:t>em</a:t>
-            </a:r>
-            <a:r>
-              <a:rPr lang="en-US" dirty="0"/>
-              <a:t> Flutter;</a:t>
-            </a:r>
-          </a:p>
-          <a:p>
-            <a:pPr>
-              <a:lnSpc>
-                <a:spcPct val="150000"/>
-              </a:lnSpc>
-            </a:pPr>
-            <a:r>
-              <a:rPr lang="en-US" dirty="0"/>
-              <a:t>É </a:t>
-            </a:r>
-            <a:r>
-              <a:rPr lang="en-US" dirty="0" err="1"/>
-              <a:t>responsável</a:t>
-            </a:r>
-            <a:r>
-              <a:rPr lang="en-US" dirty="0"/>
-              <a:t> pela </a:t>
-            </a:r>
-            <a:r>
-              <a:rPr lang="en-US" dirty="0" err="1"/>
-              <a:t>maioria</a:t>
-            </a:r>
-            <a:r>
-              <a:rPr lang="en-US" dirty="0"/>
-              <a:t> das </a:t>
-            </a:r>
-            <a:r>
-              <a:rPr lang="en-US" dirty="0" err="1"/>
-              <a:t>bibliotecas</a:t>
-            </a:r>
-            <a:r>
-              <a:rPr lang="en-US" dirty="0"/>
-              <a:t> que o Flutter </a:t>
-            </a:r>
-            <a:r>
-              <a:rPr lang="en-US" dirty="0" err="1"/>
-              <a:t>utiliza</a:t>
-            </a:r>
-            <a:r>
-              <a:rPr lang="en-US" dirty="0"/>
-              <a:t>, </a:t>
-            </a:r>
-            <a:r>
-              <a:rPr lang="en-US" dirty="0" err="1"/>
-              <a:t>sendo</a:t>
+              <a:t>na</a:t>
             </a:r>
             <a:r>
               <a:rPr lang="en-US" dirty="0"/>
@@ -4654,15 +4489,23 @@
             </a:r>
             <a:r>
               <a:rPr lang="en-US" dirty="0" err="1"/>
-              <a:t>elas</a:t>
-            </a:r>
-            <a:r>
-              <a:rPr lang="en-US" dirty="0"/>
-              <a:t>: </a:t>
-            </a:r>
-            <a:r>
-              <a:rPr lang="en-US" dirty="0" err="1"/>
-              <a:t>animações</a:t>
+              <a:t>linguagem</a:t>
+            </a:r>
+            <a:r>
+              <a:rPr lang="en-US" dirty="0"/>
+              <a:t> de </a:t>
+            </a:r>
+            <a:r>
+              <a:rPr lang="en-US" dirty="0" err="1"/>
+              <a:t>programação</a:t>
+            </a:r>
+            <a:r>
+              <a:rPr lang="en-US" dirty="0"/>
+              <a:t> Dart e dessa forma </a:t>
+            </a:r>
+            <a:r>
+              <a:rPr lang="en-US" dirty="0" err="1"/>
+              <a:t>podem</a:t>
             </a:r>
             <a:r>
               <a:rPr lang="en-US" dirty="0"/>
@@ -4670,51 +4513,43 @@
             </a:r>
             <a:r>
               <a:rPr lang="en-US" dirty="0" err="1"/>
-              <a:t>gráficas</a:t>
-            </a:r>
-            <a:r>
-              <a:rPr lang="en-US" dirty="0"/>
-              <a:t>, I/O de </a:t>
-            </a:r>
-            <a:r>
-              <a:rPr lang="en-US" dirty="0" err="1"/>
-              <a:t>arquivos</a:t>
-            </a:r>
-            <a:r>
-              <a:rPr lang="en-US" dirty="0"/>
-              <a:t> e rede, </a:t>
-            </a:r>
-            <a:r>
-              <a:rPr lang="en-US" dirty="0" err="1"/>
-              <a:t>suporte</a:t>
-            </a:r>
-            <a:r>
-              <a:rPr lang="en-US" dirty="0"/>
-              <a:t> à </a:t>
-            </a:r>
-            <a:r>
-              <a:rPr lang="en-US" dirty="0" err="1"/>
-              <a:t>acessibilidade</a:t>
-            </a:r>
-            <a:r>
-              <a:rPr lang="en-US" dirty="0"/>
-              <a:t> e um conjunto de ferramentas de tempo de </a:t>
-            </a:r>
-            <a:r>
-              <a:rPr lang="en-US" dirty="0" err="1"/>
-              <a:t>execução</a:t>
-            </a:r>
-            <a:r>
-              <a:rPr lang="en-US" dirty="0"/>
-              <a:t> e </a:t>
-            </a:r>
-            <a:r>
-              <a:rPr lang="en-US" dirty="0" err="1"/>
-              <a:t>compilação</a:t>
-            </a:r>
-            <a:r>
-              <a:rPr lang="en-US" dirty="0"/>
-              <a:t> do Dart.</a:t>
+              <a:t>utilizar</a:t>
+            </a:r>
+            <a:r>
+              <a:rPr lang="en-US" dirty="0"/>
+              <a:t> </a:t>
+            </a:r>
+            <a:r>
+              <a:rPr lang="en-US" dirty="0" err="1"/>
+              <a:t>os</a:t>
+            </a:r>
+            <a:r>
+              <a:rPr lang="en-US" dirty="0"/>
+              <a:t> </a:t>
+            </a:r>
+            <a:r>
+              <a:rPr lang="en-US" dirty="0" err="1"/>
+              <a:t>recursos</a:t>
+            </a:r>
+            <a:r>
+              <a:rPr lang="en-US" dirty="0"/>
+              <a:t> mais </a:t>
+            </a:r>
+            <a:r>
+              <a:rPr lang="en-US" dirty="0" err="1"/>
+              <a:t>avançados</a:t>
+            </a:r>
+            <a:r>
+              <a:rPr lang="en-US" dirty="0"/>
+              <a:t> da </a:t>
+            </a:r>
+            <a:r>
+              <a:rPr lang="en-US" dirty="0" err="1"/>
+              <a:t>linguagem</a:t>
+            </a:r>
+            <a:r>
+              <a:rPr lang="en-US" dirty="0"/>
+              <a:t>.</a:t>
             </a:r>
           </a:p>
         </p:txBody>
@@ -4722,7 +4557,7 @@
     </p:spTree>
     <p:extLst>
       <p:ext uri="{BB962C8B-B14F-4D97-AF65-F5344CB8AC3E}">
-        <p14:creationId xmlns:p14="http://schemas.microsoft.com/office/powerpoint/2010/main" val="1566832191"/>
+        <p14:creationId xmlns:p14="http://schemas.microsoft.com/office/powerpoint/2010/main" val="2170704509"/>
       </p:ext>
     </p:extLst>
   </p:cSld>
@@ -4754,7 +4589,7 @@
           <p:cNvPr id="2" name="Título 1">
             <a:extLst>
               <a:ext uri="{FF2B5EF4-FFF2-40B4-BE49-F238E27FC236}">
-                <a16:creationId xmlns:a16="http://schemas.microsoft.com/office/drawing/2014/main" id="{0D45138A-5235-4F29-9423-10959AC711E9}"/>
+                <a16:creationId xmlns:a16="http://schemas.microsoft.com/office/drawing/2014/main" id="{C7649A9F-4BF0-44EB-AAC4-EE9537A036D1}"/>
               </a:ext>
             </a:extLst>
           </p:cNvPr>
@@ -4771,12 +4606,8 @@
           <a:lstStyle/>
           <a:p>
             <a:r>
-              <a:rPr lang="en-US" dirty="0" err="1"/>
-              <a:t>Biblioteca</a:t>
-            </a:r>
-            <a:r>
-              <a:rPr lang="en-US" dirty="0"/>
-              <a:t> Foundation</a:t>
+              <a:rPr lang="en-US" dirty="0"/>
+              <a:t>Flutter Engine</a:t>
             </a:r>
           </a:p>
         </p:txBody>
@@ -4786,7 +4617,7 @@
           <p:cNvPr id="3" name="Espaço Reservado para Conteúdo 2">
             <a:extLst>
               <a:ext uri="{FF2B5EF4-FFF2-40B4-BE49-F238E27FC236}">
-                <a16:creationId xmlns:a16="http://schemas.microsoft.com/office/drawing/2014/main" id="{0B8D8FAB-1808-4ECF-85AA-F4138B529E08}"/>
+                <a16:creationId xmlns:a16="http://schemas.microsoft.com/office/drawing/2014/main" id="{EE2C7860-58D5-4C7E-855A-562C2E4D797C}"/>
               </a:ext>
             </a:extLst>
           </p:cNvPr>
@@ -4799,7 +4630,7 @@
         </p:nvSpPr>
         <p:spPr>
           <a:xfrm>
-            <a:off x="1371600" y="1877628"/>
+            <a:off x="1371600" y="1852104"/>
             <a:ext cx="9601200" cy="3581400"/>
           </a:xfrm>
         </p:spPr>
@@ -4813,8 +4644,20 @@
               </a:lnSpc>
             </a:pPr>
             <a:r>
-              <a:rPr lang="en-US" dirty="0" err="1"/>
-              <a:t>Escrita</a:t>
+              <a:rPr lang="en-US" dirty="0"/>
+              <a:t>É o “</a:t>
+            </a:r>
+            <a:r>
+              <a:rPr lang="en-US" dirty="0" err="1"/>
+              <a:t>coração</a:t>
+            </a:r>
+            <a:r>
+              <a:rPr lang="en-US" dirty="0"/>
+              <a:t>” do Flutter, </a:t>
+            </a:r>
+            <a:r>
+              <a:rPr lang="en-US" dirty="0" err="1"/>
+              <a:t>escrito</a:t>
             </a:r>
             <a:r>
               <a:rPr lang="en-US" dirty="0"/>
@@ -4826,7 +4669,7 @@
             </a:r>
             <a:r>
               <a:rPr lang="en-US" dirty="0"/>
-              <a:t> Dart;</a:t>
+              <a:t> C++;</a:t>
             </a:r>
           </a:p>
           <a:p>
@@ -4837,27 +4680,86 @@
             </a:pPr>
             <a:r>
               <a:rPr lang="en-US" dirty="0"/>
+              <a:t>É um runtime </a:t>
+            </a:r>
+            <a:r>
+              <a:rPr lang="en-US" dirty="0" err="1"/>
+              <a:t>portátil</a:t>
+            </a:r>
+            <a:r>
+              <a:rPr lang="en-US" dirty="0"/>
+              <a:t> para </a:t>
+            </a:r>
+            <a:r>
+              <a:rPr lang="en-US" dirty="0" err="1"/>
+              <a:t>hospedar</a:t>
+            </a:r>
+            <a:r>
+              <a:rPr lang="en-US" dirty="0"/>
+              <a:t> </a:t>
+            </a:r>
+            <a:r>
+              <a:rPr lang="en-US" dirty="0" err="1"/>
+              <a:t>aplicativos</a:t>
+            </a:r>
+            <a:r>
+              <a:rPr lang="en-US" dirty="0"/>
+              <a:t> </a:t>
+            </a:r>
+            <a:r>
+              <a:rPr lang="en-US" dirty="0" err="1"/>
+              <a:t>em</a:t>
+            </a:r>
+            <a:r>
+              <a:rPr lang="en-US" dirty="0"/>
+              <a:t> Flutter;</a:t>
+            </a:r>
+          </a:p>
+          <a:p>
+            <a:pPr>
+              <a:lnSpc>
+                <a:spcPct val="150000"/>
+              </a:lnSpc>
+            </a:pPr>
+            <a:r>
+              <a:rPr lang="en-US" dirty="0"/>
               <a:t>É </a:t>
             </a:r>
             <a:r>
               <a:rPr lang="en-US" dirty="0" err="1"/>
-              <a:t>ela</a:t>
-            </a:r>
-            <a:r>
-              <a:rPr lang="en-US" dirty="0"/>
-              <a:t> que </a:t>
-            </a:r>
-            <a:r>
-              <a:rPr lang="en-US" dirty="0" err="1"/>
-              <a:t>fornece</a:t>
-            </a:r>
-            <a:r>
-              <a:rPr lang="en-US" dirty="0"/>
-              <a:t> classes e </a:t>
-            </a:r>
-            <a:r>
-              <a:rPr lang="en-US" dirty="0" err="1"/>
-              <a:t>funções</a:t>
+              <a:t>responsável</a:t>
+            </a:r>
+            <a:r>
+              <a:rPr lang="en-US" dirty="0"/>
+              <a:t> pela </a:t>
+            </a:r>
+            <a:r>
+              <a:rPr lang="en-US" dirty="0" err="1"/>
+              <a:t>maioria</a:t>
+            </a:r>
+            <a:r>
+              <a:rPr lang="en-US" dirty="0"/>
+              <a:t> das </a:t>
+            </a:r>
+            <a:r>
+              <a:rPr lang="en-US" dirty="0" err="1"/>
+              <a:t>bibliotecas</a:t>
+            </a:r>
+            <a:r>
+              <a:rPr lang="en-US" dirty="0"/>
+              <a:t> que o Flutter </a:t>
+            </a:r>
+            <a:r>
+              <a:rPr lang="en-US" dirty="0" err="1"/>
+              <a:t>utiliza</a:t>
+            </a:r>
+            <a:r>
+              <a:rPr lang="en-US" dirty="0"/>
+              <a:t>, </a:t>
+            </a:r>
+            <a:r>
+              <a:rPr lang="en-US" dirty="0" err="1"/>
+              <a:t>sendo</a:t>
             </a:r>
             <a:r>
               <a:rPr lang="en-US" dirty="0"/>
@@ -4865,15 +4767,15 @@
             </a:r>
             <a:r>
               <a:rPr lang="en-US" dirty="0" err="1"/>
-              <a:t>básicas</a:t>
-            </a:r>
-            <a:r>
-              <a:rPr lang="en-US" dirty="0"/>
-              <a:t> que </a:t>
-            </a:r>
-            <a:r>
-              <a:rPr lang="en-US" dirty="0" err="1"/>
-              <a:t>são</a:t>
+              <a:t>elas</a:t>
+            </a:r>
+            <a:r>
+              <a:rPr lang="en-US" dirty="0"/>
+              <a:t>: </a:t>
+            </a:r>
+            <a:r>
+              <a:rPr lang="en-US" dirty="0" err="1"/>
+              <a:t>animações</a:t>
             </a:r>
             <a:r>
               <a:rPr lang="en-US" dirty="0"/>
@@ -4881,59 +4783,51 @@
             </a:r>
             <a:r>
               <a:rPr lang="en-US" dirty="0" err="1"/>
-              <a:t>utilizadas</a:t>
-            </a:r>
-            <a:r>
-              <a:rPr lang="en-US" dirty="0"/>
-              <a:t> para </a:t>
-            </a:r>
-            <a:r>
-              <a:rPr lang="en-US" dirty="0" err="1"/>
-              <a:t>desenvolver</a:t>
-            </a:r>
-            <a:r>
-              <a:rPr lang="en-US" dirty="0"/>
-              <a:t> com o Flutter. Inclusive, é </a:t>
-            </a:r>
-            <a:r>
-              <a:rPr lang="en-US" dirty="0" err="1"/>
-              <a:t>essa</a:t>
-            </a:r>
-            <a:r>
-              <a:rPr lang="en-US" dirty="0"/>
-              <a:t> </a:t>
-            </a:r>
-            <a:r>
-              <a:rPr lang="en-US" dirty="0" err="1"/>
-              <a:t>biblioteca</a:t>
-            </a:r>
-            <a:r>
-              <a:rPr lang="en-US" dirty="0"/>
-              <a:t> que </a:t>
-            </a:r>
-            <a:r>
-              <a:rPr lang="en-US" dirty="0" err="1"/>
-              <a:t>fornece</a:t>
-            </a:r>
-            <a:r>
-              <a:rPr lang="en-US" dirty="0"/>
-              <a:t> APIs para a </a:t>
-            </a:r>
-            <a:r>
-              <a:rPr lang="en-US" dirty="0" err="1"/>
-              <a:t>comunicação</a:t>
-            </a:r>
-            <a:r>
-              <a:rPr lang="en-US" dirty="0"/>
-              <a:t> com Engine </a:t>
-            </a:r>
-            <a:r>
-              <a:rPr lang="en-US" dirty="0" err="1"/>
-              <a:t>falada</a:t>
-            </a:r>
-            <a:r>
-              <a:rPr lang="en-US" dirty="0"/>
-              <a:t> antes.</a:t>
+              <a:t>gráficas</a:t>
+            </a:r>
+            <a:r>
+              <a:rPr lang="en-US" dirty="0"/>
+              <a:t>, I/O de </a:t>
+            </a:r>
+            <a:r>
+              <a:rPr lang="en-US" dirty="0" err="1"/>
+              <a:t>arquivos</a:t>
+            </a:r>
+            <a:r>
+              <a:rPr lang="en-US" dirty="0"/>
+              <a:t> e rede, </a:t>
+            </a:r>
+            <a:r>
+              <a:rPr lang="en-US" dirty="0" err="1"/>
+              <a:t>suporte</a:t>
+            </a:r>
+            <a:r>
+              <a:rPr lang="en-US" dirty="0"/>
+              <a:t> à </a:t>
+            </a:r>
+            <a:r>
+              <a:rPr lang="en-US" dirty="0" err="1"/>
+              <a:t>acessibilidade</a:t>
+            </a:r>
+            <a:r>
+              <a:rPr lang="en-US" dirty="0"/>
+              <a:t> e um conjunto de ferramentas de tempo de </a:t>
+            </a:r>
+            <a:r>
+              <a:rPr lang="en-US" dirty="0" err="1"/>
+              <a:t>execução</a:t>
+            </a:r>
+            <a:r>
+              <a:rPr lang="en-US" dirty="0"/>
+              <a:t> e </a:t>
+            </a:r>
+            <a:r>
+              <a:rPr lang="en-US" dirty="0" err="1"/>
+              <a:t>compilação</a:t>
+            </a:r>
+            <a:r>
+              <a:rPr lang="en-US" dirty="0"/>
+              <a:t> do Dart.</a:t>
             </a:r>
           </a:p>
         </p:txBody>
@@ -4941,7 +4835,7 @@
     </p:spTree>
     <p:extLst>
       <p:ext uri="{BB962C8B-B14F-4D97-AF65-F5344CB8AC3E}">
-        <p14:creationId xmlns:p14="http://schemas.microsoft.com/office/powerpoint/2010/main" val="1694341732"/>
+        <p14:creationId xmlns:p14="http://schemas.microsoft.com/office/powerpoint/2010/main" val="1566832191"/>
       </p:ext>
     </p:extLst>
   </p:cSld>
@@ -4973,6 +4867,225 @@
           <p:cNvPr id="2" name="Título 1">
             <a:extLst>
               <a:ext uri="{FF2B5EF4-FFF2-40B4-BE49-F238E27FC236}">
+                <a16:creationId xmlns:a16="http://schemas.microsoft.com/office/drawing/2014/main" id="{0D45138A-5235-4F29-9423-10959AC711E9}"/>
+              </a:ext>
+            </a:extLst>
+          </p:cNvPr>
+          <p:cNvSpPr>
+            <a:spLocks noGrp="1"/>
+          </p:cNvSpPr>
+          <p:nvPr>
+            <p:ph type="title"/>
+          </p:nvPr>
+        </p:nvSpPr>
+        <p:spPr/>
+        <p:txBody>
+          <a:bodyPr/>
+          <a:lstStyle/>
+          <a:p>
+            <a:r>
+              <a:rPr lang="en-US" dirty="0" err="1"/>
+              <a:t>Biblioteca</a:t>
+            </a:r>
+            <a:r>
+              <a:rPr lang="en-US" dirty="0"/>
+              <a:t> Foundation</a:t>
+            </a:r>
+          </a:p>
+        </p:txBody>
+      </p:sp>
+      <p:sp>
+        <p:nvSpPr>
+          <p:cNvPr id="3" name="Espaço Reservado para Conteúdo 2">
+            <a:extLst>
+              <a:ext uri="{FF2B5EF4-FFF2-40B4-BE49-F238E27FC236}">
+                <a16:creationId xmlns:a16="http://schemas.microsoft.com/office/drawing/2014/main" id="{0B8D8FAB-1808-4ECF-85AA-F4138B529E08}"/>
+              </a:ext>
+            </a:extLst>
+          </p:cNvPr>
+          <p:cNvSpPr>
+            <a:spLocks noGrp="1"/>
+          </p:cNvSpPr>
+          <p:nvPr>
+            <p:ph idx="1"/>
+          </p:nvPr>
+        </p:nvSpPr>
+        <p:spPr>
+          <a:xfrm>
+            <a:off x="1371600" y="1877628"/>
+            <a:ext cx="9601200" cy="3581400"/>
+          </a:xfrm>
+        </p:spPr>
+        <p:txBody>
+          <a:bodyPr/>
+          <a:lstStyle/>
+          <a:p>
+            <a:pPr>
+              <a:lnSpc>
+                <a:spcPct val="150000"/>
+              </a:lnSpc>
+            </a:pPr>
+            <a:r>
+              <a:rPr lang="en-US" dirty="0" err="1"/>
+              <a:t>Escrita</a:t>
+            </a:r>
+            <a:r>
+              <a:rPr lang="en-US" dirty="0"/>
+              <a:t> </a:t>
+            </a:r>
+            <a:r>
+              <a:rPr lang="en-US" dirty="0" err="1"/>
+              <a:t>em</a:t>
+            </a:r>
+            <a:r>
+              <a:rPr lang="en-US" dirty="0"/>
+              <a:t> Dart;</a:t>
+            </a:r>
+          </a:p>
+          <a:p>
+            <a:pPr>
+              <a:lnSpc>
+                <a:spcPct val="150000"/>
+              </a:lnSpc>
+            </a:pPr>
+            <a:r>
+              <a:rPr lang="en-US" dirty="0"/>
+              <a:t>É </a:t>
+            </a:r>
+            <a:r>
+              <a:rPr lang="en-US" dirty="0" err="1"/>
+              <a:t>ela</a:t>
+            </a:r>
+            <a:r>
+              <a:rPr lang="en-US" dirty="0"/>
+              <a:t> que </a:t>
+            </a:r>
+            <a:r>
+              <a:rPr lang="en-US" dirty="0" err="1"/>
+              <a:t>fornece</a:t>
+            </a:r>
+            <a:r>
+              <a:rPr lang="en-US" dirty="0"/>
+              <a:t> classes e </a:t>
+            </a:r>
+            <a:r>
+              <a:rPr lang="en-US" dirty="0" err="1"/>
+              <a:t>funções</a:t>
+            </a:r>
+            <a:r>
+              <a:rPr lang="en-US" dirty="0"/>
+              <a:t> </a:t>
+            </a:r>
+            <a:r>
+              <a:rPr lang="en-US" dirty="0" err="1"/>
+              <a:t>básicas</a:t>
+            </a:r>
+            <a:r>
+              <a:rPr lang="en-US" dirty="0"/>
+              <a:t> que </a:t>
+            </a:r>
+            <a:r>
+              <a:rPr lang="en-US" dirty="0" err="1"/>
+              <a:t>são</a:t>
+            </a:r>
+            <a:r>
+              <a:rPr lang="en-US" dirty="0"/>
+              <a:t> </a:t>
+            </a:r>
+            <a:r>
+              <a:rPr lang="en-US" dirty="0" err="1"/>
+              <a:t>utilizadas</a:t>
+            </a:r>
+            <a:r>
+              <a:rPr lang="en-US" dirty="0"/>
+              <a:t> para </a:t>
+            </a:r>
+            <a:r>
+              <a:rPr lang="en-US" dirty="0" err="1"/>
+              <a:t>desenvolver</a:t>
+            </a:r>
+            <a:r>
+              <a:rPr lang="en-US" dirty="0"/>
+              <a:t> com o Flutter. Inclusive, é </a:t>
+            </a:r>
+            <a:r>
+              <a:rPr lang="en-US" dirty="0" err="1"/>
+              <a:t>essa</a:t>
+            </a:r>
+            <a:r>
+              <a:rPr lang="en-US" dirty="0"/>
+              <a:t> </a:t>
+            </a:r>
+            <a:r>
+              <a:rPr lang="en-US" dirty="0" err="1"/>
+              <a:t>biblioteca</a:t>
+            </a:r>
+            <a:r>
+              <a:rPr lang="en-US" dirty="0"/>
+              <a:t> que </a:t>
+            </a:r>
+            <a:r>
+              <a:rPr lang="en-US" dirty="0" err="1"/>
+              <a:t>fornece</a:t>
+            </a:r>
+            <a:r>
+              <a:rPr lang="en-US" dirty="0"/>
+              <a:t> APIs para a </a:t>
+            </a:r>
+            <a:r>
+              <a:rPr lang="en-US" dirty="0" err="1"/>
+              <a:t>comunicação</a:t>
+            </a:r>
+            <a:r>
+              <a:rPr lang="en-US" dirty="0"/>
+              <a:t> com Engine </a:t>
+            </a:r>
+            <a:r>
+              <a:rPr lang="en-US" dirty="0" err="1"/>
+              <a:t>falada</a:t>
+            </a:r>
+            <a:r>
+              <a:rPr lang="en-US" dirty="0"/>
+              <a:t> antes.</a:t>
+            </a:r>
+          </a:p>
+        </p:txBody>
+      </p:sp>
+    </p:spTree>
+    <p:extLst>
+      <p:ext uri="{BB962C8B-B14F-4D97-AF65-F5344CB8AC3E}">
+        <p14:creationId xmlns:p14="http://schemas.microsoft.com/office/powerpoint/2010/main" val="1694341732"/>
+      </p:ext>
+    </p:extLst>
+  </p:cSld>
+  <p:clrMapOvr>
+    <a:masterClrMapping/>
+  </p:clrMapOvr>
+</p:sld>
+</file>
+
+<file path=ppt/slides/slide7.xml><?xml version="1.0" encoding="utf-8"?>
+<p:sld xmlns:a="http://schemas.openxmlformats.org/drawingml/2006/main" xmlns:r="http://schemas.openxmlformats.org/officeDocument/2006/relationships" xmlns:p="http://schemas.openxmlformats.org/presentationml/2006/main">
+  <p:cSld>
+    <p:spTree>
+      <p:nvGrpSpPr>
+        <p:cNvPr id="1" name=""/>
+        <p:cNvGrpSpPr/>
+        <p:nvPr/>
+      </p:nvGrpSpPr>
+      <p:grpSpPr>
+        <a:xfrm>
+          <a:off x="0" y="0"/>
+          <a:ext cx="0" cy="0"/>
+          <a:chOff x="0" y="0"/>
+          <a:chExt cx="0" cy="0"/>
+        </a:xfrm>
+      </p:grpSpPr>
+      <p:sp>
+        <p:nvSpPr>
+          <p:cNvPr id="2" name="Título 1">
+            <a:extLst>
+              <a:ext uri="{FF2B5EF4-FFF2-40B4-BE49-F238E27FC236}">
                 <a16:creationId xmlns:a16="http://schemas.microsoft.com/office/drawing/2014/main" id="{9EE4F445-69E3-436B-8306-EA9258DD3FB9}"/>
               </a:ext>
             </a:extLst>
@@ -5110,7 +5223,7 @@
 </p:sld>
 </file>
 
-<file path=ppt/slides/slide7.xml><?xml version="1.0" encoding="utf-8"?>
+<file path=ppt/slides/slide8.xml><?xml version="1.0" encoding="utf-8"?>
 <p:sld xmlns:a="http://schemas.openxmlformats.org/drawingml/2006/main" xmlns:r="http://schemas.openxmlformats.org/officeDocument/2006/relationships" xmlns:p="http://schemas.openxmlformats.org/presentationml/2006/main">
   <p:cSld>
     <p:spTree>

</xml_diff>